<commit_message>
Remarks from Odalric (thanks!)
</commit_message>
<xml_diff>
--- a/img/graphs.pptx
+++ b/img/graphs.pptx
@@ -198,7 +198,7 @@
           <a:p>
             <a:fld id="{7032D634-87B9-4515-9E90-7412EACBC911}" type="datetimeFigureOut">
               <a:rPr lang="fr-FR" smtClean="0"/>
-              <a:t>29/03/2020</a:t>
+              <a:t>02/04/2020</a:t>
             </a:fld>
             <a:endParaRPr lang="fr-FR"/>
           </a:p>
@@ -596,7 +596,7 @@
           <a:p>
             <a:fld id="{CC506755-3F84-4679-BA59-3527CD676A9A}" type="datetimeFigureOut">
               <a:rPr lang="fr-FR" smtClean="0"/>
-              <a:t>29/03/2020</a:t>
+              <a:t>02/04/2020</a:t>
             </a:fld>
             <a:endParaRPr lang="fr-FR"/>
           </a:p>
@@ -766,7 +766,7 @@
           <a:p>
             <a:fld id="{CC506755-3F84-4679-BA59-3527CD676A9A}" type="datetimeFigureOut">
               <a:rPr lang="fr-FR" smtClean="0"/>
-              <a:t>29/03/2020</a:t>
+              <a:t>02/04/2020</a:t>
             </a:fld>
             <a:endParaRPr lang="fr-FR"/>
           </a:p>
@@ -946,7 +946,7 @@
           <a:p>
             <a:fld id="{CC506755-3F84-4679-BA59-3527CD676A9A}" type="datetimeFigureOut">
               <a:rPr lang="fr-FR" smtClean="0"/>
-              <a:t>29/03/2020</a:t>
+              <a:t>02/04/2020</a:t>
             </a:fld>
             <a:endParaRPr lang="fr-FR"/>
           </a:p>
@@ -1116,7 +1116,7 @@
           <a:p>
             <a:fld id="{CC506755-3F84-4679-BA59-3527CD676A9A}" type="datetimeFigureOut">
               <a:rPr lang="fr-FR" smtClean="0"/>
-              <a:t>29/03/2020</a:t>
+              <a:t>02/04/2020</a:t>
             </a:fld>
             <a:endParaRPr lang="fr-FR"/>
           </a:p>
@@ -1360,7 +1360,7 @@
           <a:p>
             <a:fld id="{CC506755-3F84-4679-BA59-3527CD676A9A}" type="datetimeFigureOut">
               <a:rPr lang="fr-FR" smtClean="0"/>
-              <a:t>29/03/2020</a:t>
+              <a:t>02/04/2020</a:t>
             </a:fld>
             <a:endParaRPr lang="fr-FR"/>
           </a:p>
@@ -1592,7 +1592,7 @@
           <a:p>
             <a:fld id="{CC506755-3F84-4679-BA59-3527CD676A9A}" type="datetimeFigureOut">
               <a:rPr lang="fr-FR" smtClean="0"/>
-              <a:t>29/03/2020</a:t>
+              <a:t>02/04/2020</a:t>
             </a:fld>
             <a:endParaRPr lang="fr-FR"/>
           </a:p>
@@ -1959,7 +1959,7 @@
           <a:p>
             <a:fld id="{CC506755-3F84-4679-BA59-3527CD676A9A}" type="datetimeFigureOut">
               <a:rPr lang="fr-FR" smtClean="0"/>
-              <a:t>29/03/2020</a:t>
+              <a:t>02/04/2020</a:t>
             </a:fld>
             <a:endParaRPr lang="fr-FR"/>
           </a:p>
@@ -2077,7 +2077,7 @@
           <a:p>
             <a:fld id="{CC506755-3F84-4679-BA59-3527CD676A9A}" type="datetimeFigureOut">
               <a:rPr lang="fr-FR" smtClean="0"/>
-              <a:t>29/03/2020</a:t>
+              <a:t>02/04/2020</a:t>
             </a:fld>
             <a:endParaRPr lang="fr-FR"/>
           </a:p>
@@ -2172,7 +2172,7 @@
           <a:p>
             <a:fld id="{CC506755-3F84-4679-BA59-3527CD676A9A}" type="datetimeFigureOut">
               <a:rPr lang="fr-FR" smtClean="0"/>
-              <a:t>29/03/2020</a:t>
+              <a:t>02/04/2020</a:t>
             </a:fld>
             <a:endParaRPr lang="fr-FR"/>
           </a:p>
@@ -2449,7 +2449,7 @@
           <a:p>
             <a:fld id="{CC506755-3F84-4679-BA59-3527CD676A9A}" type="datetimeFigureOut">
               <a:rPr lang="fr-FR" smtClean="0"/>
-              <a:t>29/03/2020</a:t>
+              <a:t>02/04/2020</a:t>
             </a:fld>
             <a:endParaRPr lang="fr-FR"/>
           </a:p>
@@ -2706,7 +2706,7 @@
           <a:p>
             <a:fld id="{CC506755-3F84-4679-BA59-3527CD676A9A}" type="datetimeFigureOut">
               <a:rPr lang="fr-FR" smtClean="0"/>
-              <a:t>29/03/2020</a:t>
+              <a:t>02/04/2020</a:t>
             </a:fld>
             <a:endParaRPr lang="fr-FR"/>
           </a:p>
@@ -2919,7 +2919,7 @@
           <a:p>
             <a:fld id="{CC506755-3F84-4679-BA59-3527CD676A9A}" type="datetimeFigureOut">
               <a:rPr lang="fr-FR" smtClean="0"/>
-              <a:t>29/03/2020</a:t>
+              <a:t>02/04/2020</a:t>
             </a:fld>
             <a:endParaRPr lang="fr-FR"/>
           </a:p>
@@ -4932,51 +4932,6 @@
       </mc:AlternateContent>
       <p:cxnSp>
         <p:nvCxnSpPr>
-          <p:cNvPr id="43" name="Connecteur droit 42">
-            <a:extLst>
-              <a:ext uri="{FF2B5EF4-FFF2-40B4-BE49-F238E27FC236}">
-                <a16:creationId xmlns:a16="http://schemas.microsoft.com/office/drawing/2014/main" id="{B4A950EF-C211-4A15-B874-76E682760B28}"/>
-              </a:ext>
-            </a:extLst>
-          </p:cNvPr>
-          <p:cNvCxnSpPr>
-            <a:cxnSpLocks/>
-          </p:cNvCxnSpPr>
-          <p:nvPr/>
-        </p:nvCxnSpPr>
-        <p:spPr>
-          <a:xfrm>
-            <a:off x="4704557" y="3589747"/>
-            <a:ext cx="0" cy="0"/>
-          </a:xfrm>
-          <a:prstGeom prst="line">
-            <a:avLst/>
-          </a:prstGeom>
-          <a:ln w="28575">
-            <a:solidFill>
-              <a:srgbClr val="0070C0"/>
-            </a:solidFill>
-            <a:headEnd type="oval" w="lg" len="lg"/>
-            <a:tailEnd type="oval"/>
-          </a:ln>
-        </p:spPr>
-        <p:style>
-          <a:lnRef idx="1">
-            <a:schemeClr val="accent1"/>
-          </a:lnRef>
-          <a:fillRef idx="0">
-            <a:schemeClr val="accent1"/>
-          </a:fillRef>
-          <a:effectRef idx="0">
-            <a:schemeClr val="accent1"/>
-          </a:effectRef>
-          <a:fontRef idx="minor">
-            <a:schemeClr val="tx1"/>
-          </a:fontRef>
-        </p:style>
-      </p:cxnSp>
-      <p:cxnSp>
-        <p:nvCxnSpPr>
           <p:cNvPr id="45" name="Connecteur droit 44">
             <a:extLst>
               <a:ext uri="{FF2B5EF4-FFF2-40B4-BE49-F238E27FC236}">
@@ -5127,7 +5082,7 @@
         <p:spPr>
           <a:xfrm flipV="1">
             <a:off x="2951956" y="624365"/>
-            <a:ext cx="0" cy="997266"/>
+            <a:ext cx="0" cy="866298"/>
           </a:xfrm>
           <a:prstGeom prst="line">
             <a:avLst/>
@@ -5304,8 +5259,8 @@
         </p:nvSpPr>
         <p:spPr>
           <a:xfrm>
-            <a:off x="2941320" y="1577340"/>
-            <a:ext cx="1737360" cy="1935480"/>
+            <a:off x="3043714" y="1605915"/>
+            <a:ext cx="1634966" cy="1906905"/>
           </a:xfrm>
           <a:custGeom>
             <a:avLst/>
@@ -5328,6 +5283,18 @@
               <a:gd name="connsiteY1" fmla="*/ 708660 h 1935480"/>
               <a:gd name="connsiteX2" fmla="*/ 1737360 w 1737360"/>
               <a:gd name="connsiteY2" fmla="*/ 1935480 h 1935480"/>
+              <a:gd name="connsiteX0" fmla="*/ 0 w 1627822"/>
+              <a:gd name="connsiteY0" fmla="*/ 0 h 1880711"/>
+              <a:gd name="connsiteX1" fmla="*/ 1010602 w 1627822"/>
+              <a:gd name="connsiteY1" fmla="*/ 653891 h 1880711"/>
+              <a:gd name="connsiteX2" fmla="*/ 1627822 w 1627822"/>
+              <a:gd name="connsiteY2" fmla="*/ 1880711 h 1880711"/>
+              <a:gd name="connsiteX0" fmla="*/ 0 w 1634966"/>
+              <a:gd name="connsiteY0" fmla="*/ 0 h 1906905"/>
+              <a:gd name="connsiteX1" fmla="*/ 1017746 w 1634966"/>
+              <a:gd name="connsiteY1" fmla="*/ 680085 h 1906905"/>
+              <a:gd name="connsiteX2" fmla="*/ 1634966 w 1634966"/>
+              <a:gd name="connsiteY2" fmla="*/ 1906905 h 1906905"/>
             </a:gdLst>
             <a:ahLst/>
             <a:cxnLst>
@@ -5343,19 +5310,19 @@
             </a:cxnLst>
             <a:rect l="l" t="t" r="r" b="b"/>
             <a:pathLst>
-              <a:path w="1737360" h="1935480">
+              <a:path w="1634966" h="1906905">
                 <a:moveTo>
                   <a:pt x="0" y="0"/>
                 </a:moveTo>
                 <a:cubicBezTo>
                   <a:pt x="480060" y="204470"/>
-                  <a:pt x="830580" y="386080"/>
-                  <a:pt x="1120140" y="708660"/>
+                  <a:pt x="728186" y="357505"/>
+                  <a:pt x="1017746" y="680085"/>
                 </a:cubicBezTo>
                 <a:cubicBezTo>
-                  <a:pt x="1409700" y="1031240"/>
-                  <a:pt x="1638300" y="1494790"/>
-                  <a:pt x="1737360" y="1935480"/>
+                  <a:pt x="1307306" y="1002665"/>
+                  <a:pt x="1535906" y="1466215"/>
+                  <a:pt x="1634966" y="1906905"/>
                 </a:cubicBezTo>
               </a:path>
             </a:pathLst>
@@ -5393,51 +5360,114 @@
           </a:p>
         </p:txBody>
       </p:sp>
-      <p:cxnSp>
-        <p:nvCxnSpPr>
-          <p:cNvPr id="29" name="Connecteur droit 28">
+      <p:sp>
+        <p:nvSpPr>
+          <p:cNvPr id="18" name="Triangle isocèle 17">
             <a:extLst>
               <a:ext uri="{FF2B5EF4-FFF2-40B4-BE49-F238E27FC236}">
-                <a16:creationId xmlns:a16="http://schemas.microsoft.com/office/drawing/2014/main" id="{E9F5A0C4-F3EE-42CB-B8B3-0E047BA21819}"/>
+                <a16:creationId xmlns:a16="http://schemas.microsoft.com/office/drawing/2014/main" id="{DAE85F25-A940-494E-A4C7-426F1839A1EC}"/>
               </a:ext>
             </a:extLst>
           </p:cNvPr>
-          <p:cNvCxnSpPr>
-            <a:cxnSpLocks/>
-          </p:cNvCxnSpPr>
+          <p:cNvSpPr/>
           <p:nvPr/>
-        </p:nvCxnSpPr>
+        </p:nvSpPr>
         <p:spPr>
           <a:xfrm>
-            <a:off x="2952638" y="1571625"/>
-            <a:ext cx="0" cy="0"/>
+            <a:off x="4633594" y="3518701"/>
+            <a:ext cx="146100" cy="125949"/>
           </a:xfrm>
-          <a:prstGeom prst="line">
+          <a:prstGeom prst="triangle">
             <a:avLst/>
           </a:prstGeom>
-          <a:ln w="28575">
+          <a:solidFill>
+            <a:schemeClr val="accent2"/>
+          </a:solidFill>
+          <a:ln>
             <a:solidFill>
-              <a:srgbClr val="C00000"/>
+              <a:schemeClr val="accent2"/>
             </a:solidFill>
-            <a:headEnd type="oval" w="lg" len="lg"/>
-            <a:tailEnd type="none"/>
           </a:ln>
         </p:spPr>
         <p:style>
-          <a:lnRef idx="1">
-            <a:schemeClr val="accent1"/>
+          <a:lnRef idx="2">
+            <a:schemeClr val="accent1">
+              <a:shade val="50000"/>
+            </a:schemeClr>
           </a:lnRef>
-          <a:fillRef idx="0">
+          <a:fillRef idx="1">
             <a:schemeClr val="accent1"/>
           </a:fillRef>
           <a:effectRef idx="0">
             <a:schemeClr val="accent1"/>
           </a:effectRef>
           <a:fontRef idx="minor">
-            <a:schemeClr val="tx1"/>
+            <a:schemeClr val="lt1"/>
           </a:fontRef>
         </p:style>
-      </p:cxnSp>
+        <p:txBody>
+          <a:bodyPr rtlCol="0" anchor="ctr"/>
+          <a:lstStyle/>
+          <a:p>
+            <a:pPr algn="ctr"/>
+            <a:endParaRPr lang="fr-FR"/>
+          </a:p>
+        </p:txBody>
+      </p:sp>
+      <p:sp>
+        <p:nvSpPr>
+          <p:cNvPr id="19" name="Rectangle 18">
+            <a:extLst>
+              <a:ext uri="{FF2B5EF4-FFF2-40B4-BE49-F238E27FC236}">
+                <a16:creationId xmlns:a16="http://schemas.microsoft.com/office/drawing/2014/main" id="{909921D6-7A76-4076-8178-B4E319DA7530}"/>
+              </a:ext>
+            </a:extLst>
+          </p:cNvPr>
+          <p:cNvSpPr/>
+          <p:nvPr/>
+        </p:nvSpPr>
+        <p:spPr>
+          <a:xfrm flipH="1">
+            <a:off x="2890766" y="1508484"/>
+            <a:ext cx="124614" cy="124614"/>
+          </a:xfrm>
+          <a:prstGeom prst="rect">
+            <a:avLst/>
+          </a:prstGeom>
+          <a:solidFill>
+            <a:schemeClr val="accent1"/>
+          </a:solidFill>
+          <a:ln>
+            <a:solidFill>
+              <a:schemeClr val="accent1"/>
+            </a:solidFill>
+          </a:ln>
+        </p:spPr>
+        <p:style>
+          <a:lnRef idx="2">
+            <a:schemeClr val="accent1">
+              <a:shade val="50000"/>
+            </a:schemeClr>
+          </a:lnRef>
+          <a:fillRef idx="1">
+            <a:schemeClr val="accent1"/>
+          </a:fillRef>
+          <a:effectRef idx="0">
+            <a:schemeClr val="accent1"/>
+          </a:effectRef>
+          <a:fontRef idx="minor">
+            <a:schemeClr val="lt1"/>
+          </a:fontRef>
+        </p:style>
+        <p:txBody>
+          <a:bodyPr rtlCol="0" anchor="ctr"/>
+          <a:lstStyle/>
+          <a:p>
+            <a:pPr algn="ctr"/>
+            <a:endParaRPr lang="fr-FR"/>
+          </a:p>
+        </p:txBody>
+      </p:sp>
     </p:spTree>
     <p:extLst>
       <p:ext uri="{BB962C8B-B14F-4D97-AF65-F5344CB8AC3E}">
@@ -5562,8 +5592,8 @@
           </a:fontRef>
         </p:style>
       </p:cxnSp>
-      <mc:AlternateContent xmlns:mc="http://schemas.openxmlformats.org/markup-compatibility/2006">
-        <mc:Choice xmlns:a14="http://schemas.microsoft.com/office/drawing/2010/main" Requires="a14">
+      <mc:AlternateContent xmlns:mc="http://schemas.openxmlformats.org/markup-compatibility/2006" xmlns:a14="http://schemas.microsoft.com/office/drawing/2010/main">
+        <mc:Choice Requires="a14">
           <p:sp>
             <p:nvSpPr>
               <p:cNvPr id="41" name="ZoneTexte 40">
@@ -5635,7 +5665,7 @@
             </p:txBody>
           </p:sp>
         </mc:Choice>
-        <mc:Fallback>
+        <mc:Fallback xmlns="">
           <p:sp>
             <p:nvSpPr>
               <p:cNvPr id="41" name="ZoneTexte 40">
@@ -5685,51 +5715,6 @@
       </mc:AlternateContent>
       <p:cxnSp>
         <p:nvCxnSpPr>
-          <p:cNvPr id="43" name="Connecteur droit 42">
-            <a:extLst>
-              <a:ext uri="{FF2B5EF4-FFF2-40B4-BE49-F238E27FC236}">
-                <a16:creationId xmlns:a16="http://schemas.microsoft.com/office/drawing/2014/main" id="{B4A950EF-C211-4A15-B874-76E682760B28}"/>
-              </a:ext>
-            </a:extLst>
-          </p:cNvPr>
-          <p:cNvCxnSpPr>
-            <a:cxnSpLocks/>
-          </p:cNvCxnSpPr>
-          <p:nvPr/>
-        </p:nvCxnSpPr>
-        <p:spPr>
-          <a:xfrm>
-            <a:off x="4704557" y="3589747"/>
-            <a:ext cx="0" cy="0"/>
-          </a:xfrm>
-          <a:prstGeom prst="line">
-            <a:avLst/>
-          </a:prstGeom>
-          <a:ln w="28575">
-            <a:solidFill>
-              <a:srgbClr val="0070C0"/>
-            </a:solidFill>
-            <a:headEnd type="oval" w="lg" len="lg"/>
-            <a:tailEnd type="oval"/>
-          </a:ln>
-        </p:spPr>
-        <p:style>
-          <a:lnRef idx="1">
-            <a:schemeClr val="accent1"/>
-          </a:lnRef>
-          <a:fillRef idx="0">
-            <a:schemeClr val="accent1"/>
-          </a:fillRef>
-          <a:effectRef idx="0">
-            <a:schemeClr val="accent1"/>
-          </a:effectRef>
-          <a:fontRef idx="minor">
-            <a:schemeClr val="tx1"/>
-          </a:fontRef>
-        </p:style>
-      </p:cxnSp>
-      <p:cxnSp>
-        <p:nvCxnSpPr>
           <p:cNvPr id="45" name="Connecteur droit 44">
             <a:extLst>
               <a:ext uri="{FF2B5EF4-FFF2-40B4-BE49-F238E27FC236}">
@@ -5846,57 +5831,12 @@
           </a:prstGeom>
           <a:ln w="6350">
             <a:solidFill>
-              <a:schemeClr val="tx1"/>
-            </a:solidFill>
-            <a:headEnd type="oval" w="lg" len="lg"/>
-            <a:tailEnd type="oval" w="sm" len="sm"/>
-          </a:ln>
-        </p:spPr>
-        <p:style>
-          <a:lnRef idx="1">
-            <a:schemeClr val="accent1"/>
-          </a:lnRef>
-          <a:fillRef idx="0">
-            <a:schemeClr val="accent1"/>
-          </a:fillRef>
-          <a:effectRef idx="0">
-            <a:schemeClr val="accent1"/>
-          </a:effectRef>
-          <a:fontRef idx="minor">
-            <a:schemeClr val="tx1"/>
-          </a:fontRef>
-        </p:style>
-      </p:cxnSp>
-      <p:cxnSp>
-        <p:nvCxnSpPr>
-          <p:cNvPr id="89" name="Connecteur droit 88">
-            <a:extLst>
-              <a:ext uri="{FF2B5EF4-FFF2-40B4-BE49-F238E27FC236}">
-                <a16:creationId xmlns:a16="http://schemas.microsoft.com/office/drawing/2014/main" id="{AC4CA023-24CA-48D5-A2E8-5CF010B1369E}"/>
-              </a:ext>
-            </a:extLst>
-          </p:cNvPr>
-          <p:cNvCxnSpPr>
-            <a:cxnSpLocks/>
-          </p:cNvCxnSpPr>
-          <p:nvPr/>
-        </p:nvCxnSpPr>
-        <p:spPr>
-          <a:xfrm flipV="1">
-            <a:off x="2951956" y="624365"/>
-            <a:ext cx="0" cy="997266"/>
-          </a:xfrm>
-          <a:prstGeom prst="line">
-            <a:avLst/>
-          </a:prstGeom>
-          <a:ln>
-            <a:solidFill>
               <a:schemeClr val="bg1">
                 <a:lumMod val="65000"/>
               </a:schemeClr>
             </a:solidFill>
-            <a:headEnd type="none" w="lg" len="lg"/>
-            <a:tailEnd type="triangle" w="lg" len="lg"/>
+            <a:headEnd type="oval" w="lg" len="lg"/>
+            <a:tailEnd type="oval" w="sm" len="sm"/>
           </a:ln>
         </p:spPr>
         <p:style>
@@ -6032,160 +5972,12 @@
           </a:prstGeom>
           <a:ln w="6350">
             <a:solidFill>
-              <a:schemeClr val="tx1"/>
-            </a:solidFill>
-            <a:headEnd type="oval" w="lg" len="lg"/>
-            <a:tailEnd type="oval" w="sm" len="sm"/>
-          </a:ln>
-        </p:spPr>
-        <p:style>
-          <a:lnRef idx="1">
-            <a:schemeClr val="accent1"/>
-          </a:lnRef>
-          <a:fillRef idx="0">
-            <a:schemeClr val="accent1"/>
-          </a:fillRef>
-          <a:effectRef idx="0">
-            <a:schemeClr val="accent1"/>
-          </a:effectRef>
-          <a:fontRef idx="minor">
-            <a:schemeClr val="tx1"/>
-          </a:fontRef>
-        </p:style>
-      </p:cxnSp>
-      <p:sp>
-        <p:nvSpPr>
-          <p:cNvPr id="109" name="Forme libre : forme 108">
-            <a:extLst>
-              <a:ext uri="{FF2B5EF4-FFF2-40B4-BE49-F238E27FC236}">
-                <a16:creationId xmlns:a16="http://schemas.microsoft.com/office/drawing/2014/main" id="{38BF95D1-8ACF-4662-8EB3-979B8A6819D2}"/>
-              </a:ext>
-            </a:extLst>
-          </p:cNvPr>
-          <p:cNvSpPr/>
-          <p:nvPr/>
-        </p:nvSpPr>
-        <p:spPr>
-          <a:xfrm>
-            <a:off x="2941320" y="1577340"/>
-            <a:ext cx="1737360" cy="1935480"/>
-          </a:xfrm>
-          <a:custGeom>
-            <a:avLst/>
-            <a:gdLst>
-              <a:gd name="connsiteX0" fmla="*/ 0 w 1737360"/>
-              <a:gd name="connsiteY0" fmla="*/ 0 h 1935480"/>
-              <a:gd name="connsiteX1" fmla="*/ 1249680 w 1737360"/>
-              <a:gd name="connsiteY1" fmla="*/ 731520 h 1935480"/>
-              <a:gd name="connsiteX2" fmla="*/ 1737360 w 1737360"/>
-              <a:gd name="connsiteY2" fmla="*/ 1935480 h 1935480"/>
-              <a:gd name="connsiteX0" fmla="*/ 0 w 1737360"/>
-              <a:gd name="connsiteY0" fmla="*/ 0 h 1935480"/>
-              <a:gd name="connsiteX1" fmla="*/ 1112520 w 1737360"/>
-              <a:gd name="connsiteY1" fmla="*/ 678180 h 1935480"/>
-              <a:gd name="connsiteX2" fmla="*/ 1737360 w 1737360"/>
-              <a:gd name="connsiteY2" fmla="*/ 1935480 h 1935480"/>
-              <a:gd name="connsiteX0" fmla="*/ 0 w 1737360"/>
-              <a:gd name="connsiteY0" fmla="*/ 0 h 1935480"/>
-              <a:gd name="connsiteX1" fmla="*/ 1120140 w 1737360"/>
-              <a:gd name="connsiteY1" fmla="*/ 708660 h 1935480"/>
-              <a:gd name="connsiteX2" fmla="*/ 1737360 w 1737360"/>
-              <a:gd name="connsiteY2" fmla="*/ 1935480 h 1935480"/>
-            </a:gdLst>
-            <a:ahLst/>
-            <a:cxnLst>
-              <a:cxn ang="0">
-                <a:pos x="connsiteX0" y="connsiteY0"/>
-              </a:cxn>
-              <a:cxn ang="0">
-                <a:pos x="connsiteX1" y="connsiteY1"/>
-              </a:cxn>
-              <a:cxn ang="0">
-                <a:pos x="connsiteX2" y="connsiteY2"/>
-              </a:cxn>
-            </a:cxnLst>
-            <a:rect l="l" t="t" r="r" b="b"/>
-            <a:pathLst>
-              <a:path w="1737360" h="1935480">
-                <a:moveTo>
-                  <a:pt x="0" y="0"/>
-                </a:moveTo>
-                <a:cubicBezTo>
-                  <a:pt x="480060" y="204470"/>
-                  <a:pt x="830580" y="386080"/>
-                  <a:pt x="1120140" y="708660"/>
-                </a:cubicBezTo>
-                <a:cubicBezTo>
-                  <a:pt x="1409700" y="1031240"/>
-                  <a:pt x="1638300" y="1494790"/>
-                  <a:pt x="1737360" y="1935480"/>
-                </a:cubicBezTo>
-              </a:path>
-            </a:pathLst>
-          </a:custGeom>
-          <a:noFill/>
-          <a:ln w="6350">
-            <a:solidFill>
               <a:schemeClr val="bg1">
                 <a:lumMod val="65000"/>
               </a:schemeClr>
             </a:solidFill>
-            <a:tailEnd type="triangle" w="lg" len="lg"/>
-          </a:ln>
-        </p:spPr>
-        <p:style>
-          <a:lnRef idx="2">
-            <a:schemeClr val="accent1">
-              <a:shade val="50000"/>
-            </a:schemeClr>
-          </a:lnRef>
-          <a:fillRef idx="1">
-            <a:schemeClr val="accent1"/>
-          </a:fillRef>
-          <a:effectRef idx="0">
-            <a:schemeClr val="accent1"/>
-          </a:effectRef>
-          <a:fontRef idx="minor">
-            <a:schemeClr val="lt1"/>
-          </a:fontRef>
-        </p:style>
-        <p:txBody>
-          <a:bodyPr rtlCol="0" anchor="ctr"/>
-          <a:lstStyle/>
-          <a:p>
-            <a:pPr algn="ctr"/>
-            <a:endParaRPr lang="fr-FR"/>
-          </a:p>
-        </p:txBody>
-      </p:sp>
-      <p:cxnSp>
-        <p:nvCxnSpPr>
-          <p:cNvPr id="29" name="Connecteur droit 28">
-            <a:extLst>
-              <a:ext uri="{FF2B5EF4-FFF2-40B4-BE49-F238E27FC236}">
-                <a16:creationId xmlns:a16="http://schemas.microsoft.com/office/drawing/2014/main" id="{E9F5A0C4-F3EE-42CB-B8B3-0E047BA21819}"/>
-              </a:ext>
-            </a:extLst>
-          </p:cNvPr>
-          <p:cNvCxnSpPr>
-            <a:cxnSpLocks/>
-          </p:cNvCxnSpPr>
-          <p:nvPr/>
-        </p:nvCxnSpPr>
-        <p:spPr>
-          <a:xfrm>
-            <a:off x="2952638" y="1571625"/>
-            <a:ext cx="0" cy="0"/>
-          </a:xfrm>
-          <a:prstGeom prst="line">
-            <a:avLst/>
-          </a:prstGeom>
-          <a:ln w="28575">
-            <a:solidFill>
-              <a:srgbClr val="C00000"/>
-            </a:solidFill>
             <a:headEnd type="oval" w="lg" len="lg"/>
-            <a:tailEnd type="none"/>
+            <a:tailEnd type="oval" w="sm" len="sm"/>
           </a:ln>
         </p:spPr>
         <p:style>
@@ -6622,6 +6414,278 @@
           </a:fontRef>
         </p:style>
       </p:cxnSp>
+      <p:cxnSp>
+        <p:nvCxnSpPr>
+          <p:cNvPr id="23" name="Connecteur droit 22">
+            <a:extLst>
+              <a:ext uri="{FF2B5EF4-FFF2-40B4-BE49-F238E27FC236}">
+                <a16:creationId xmlns:a16="http://schemas.microsoft.com/office/drawing/2014/main" id="{10813841-9898-4936-8841-FC92F5F89F44}"/>
+              </a:ext>
+            </a:extLst>
+          </p:cNvPr>
+          <p:cNvCxnSpPr>
+            <a:cxnSpLocks/>
+          </p:cNvCxnSpPr>
+          <p:nvPr/>
+        </p:nvCxnSpPr>
+        <p:spPr>
+          <a:xfrm flipV="1">
+            <a:off x="2951956" y="624365"/>
+            <a:ext cx="0" cy="866298"/>
+          </a:xfrm>
+          <a:prstGeom prst="line">
+            <a:avLst/>
+          </a:prstGeom>
+          <a:ln w="6350">
+            <a:solidFill>
+              <a:schemeClr val="bg1">
+                <a:lumMod val="65000"/>
+              </a:schemeClr>
+            </a:solidFill>
+            <a:headEnd type="none" w="lg" len="lg"/>
+            <a:tailEnd type="triangle" w="lg" len="lg"/>
+          </a:ln>
+        </p:spPr>
+        <p:style>
+          <a:lnRef idx="1">
+            <a:schemeClr val="accent1"/>
+          </a:lnRef>
+          <a:fillRef idx="0">
+            <a:schemeClr val="accent1"/>
+          </a:fillRef>
+          <a:effectRef idx="0">
+            <a:schemeClr val="accent1"/>
+          </a:effectRef>
+          <a:fontRef idx="minor">
+            <a:schemeClr val="tx1"/>
+          </a:fontRef>
+        </p:style>
+      </p:cxnSp>
+      <p:sp>
+        <p:nvSpPr>
+          <p:cNvPr id="24" name="Forme libre : forme 23">
+            <a:extLst>
+              <a:ext uri="{FF2B5EF4-FFF2-40B4-BE49-F238E27FC236}">
+                <a16:creationId xmlns:a16="http://schemas.microsoft.com/office/drawing/2014/main" id="{8C0F71AF-2DA2-459A-8FC5-F58CA20F4A47}"/>
+              </a:ext>
+            </a:extLst>
+          </p:cNvPr>
+          <p:cNvSpPr/>
+          <p:nvPr/>
+        </p:nvSpPr>
+        <p:spPr>
+          <a:xfrm>
+            <a:off x="3043714" y="1605915"/>
+            <a:ext cx="1634966" cy="1906905"/>
+          </a:xfrm>
+          <a:custGeom>
+            <a:avLst/>
+            <a:gdLst>
+              <a:gd name="connsiteX0" fmla="*/ 0 w 1737360"/>
+              <a:gd name="connsiteY0" fmla="*/ 0 h 1935480"/>
+              <a:gd name="connsiteX1" fmla="*/ 1249680 w 1737360"/>
+              <a:gd name="connsiteY1" fmla="*/ 731520 h 1935480"/>
+              <a:gd name="connsiteX2" fmla="*/ 1737360 w 1737360"/>
+              <a:gd name="connsiteY2" fmla="*/ 1935480 h 1935480"/>
+              <a:gd name="connsiteX0" fmla="*/ 0 w 1737360"/>
+              <a:gd name="connsiteY0" fmla="*/ 0 h 1935480"/>
+              <a:gd name="connsiteX1" fmla="*/ 1112520 w 1737360"/>
+              <a:gd name="connsiteY1" fmla="*/ 678180 h 1935480"/>
+              <a:gd name="connsiteX2" fmla="*/ 1737360 w 1737360"/>
+              <a:gd name="connsiteY2" fmla="*/ 1935480 h 1935480"/>
+              <a:gd name="connsiteX0" fmla="*/ 0 w 1737360"/>
+              <a:gd name="connsiteY0" fmla="*/ 0 h 1935480"/>
+              <a:gd name="connsiteX1" fmla="*/ 1120140 w 1737360"/>
+              <a:gd name="connsiteY1" fmla="*/ 708660 h 1935480"/>
+              <a:gd name="connsiteX2" fmla="*/ 1737360 w 1737360"/>
+              <a:gd name="connsiteY2" fmla="*/ 1935480 h 1935480"/>
+              <a:gd name="connsiteX0" fmla="*/ 0 w 1627822"/>
+              <a:gd name="connsiteY0" fmla="*/ 0 h 1880711"/>
+              <a:gd name="connsiteX1" fmla="*/ 1010602 w 1627822"/>
+              <a:gd name="connsiteY1" fmla="*/ 653891 h 1880711"/>
+              <a:gd name="connsiteX2" fmla="*/ 1627822 w 1627822"/>
+              <a:gd name="connsiteY2" fmla="*/ 1880711 h 1880711"/>
+              <a:gd name="connsiteX0" fmla="*/ 0 w 1634966"/>
+              <a:gd name="connsiteY0" fmla="*/ 0 h 1906905"/>
+              <a:gd name="connsiteX1" fmla="*/ 1017746 w 1634966"/>
+              <a:gd name="connsiteY1" fmla="*/ 680085 h 1906905"/>
+              <a:gd name="connsiteX2" fmla="*/ 1634966 w 1634966"/>
+              <a:gd name="connsiteY2" fmla="*/ 1906905 h 1906905"/>
+            </a:gdLst>
+            <a:ahLst/>
+            <a:cxnLst>
+              <a:cxn ang="0">
+                <a:pos x="connsiteX0" y="connsiteY0"/>
+              </a:cxn>
+              <a:cxn ang="0">
+                <a:pos x="connsiteX1" y="connsiteY1"/>
+              </a:cxn>
+              <a:cxn ang="0">
+                <a:pos x="connsiteX2" y="connsiteY2"/>
+              </a:cxn>
+            </a:cxnLst>
+            <a:rect l="l" t="t" r="r" b="b"/>
+            <a:pathLst>
+              <a:path w="1634966" h="1906905">
+                <a:moveTo>
+                  <a:pt x="0" y="0"/>
+                </a:moveTo>
+                <a:cubicBezTo>
+                  <a:pt x="480060" y="204470"/>
+                  <a:pt x="728186" y="357505"/>
+                  <a:pt x="1017746" y="680085"/>
+                </a:cubicBezTo>
+                <a:cubicBezTo>
+                  <a:pt x="1307306" y="1002665"/>
+                  <a:pt x="1535906" y="1466215"/>
+                  <a:pt x="1634966" y="1906905"/>
+                </a:cubicBezTo>
+              </a:path>
+            </a:pathLst>
+          </a:custGeom>
+          <a:noFill/>
+          <a:ln w="6350">
+            <a:solidFill>
+              <a:schemeClr val="bg1">
+                <a:lumMod val="65000"/>
+              </a:schemeClr>
+            </a:solidFill>
+            <a:tailEnd type="triangle" w="lg" len="lg"/>
+          </a:ln>
+        </p:spPr>
+        <p:style>
+          <a:lnRef idx="2">
+            <a:schemeClr val="accent1">
+              <a:shade val="50000"/>
+            </a:schemeClr>
+          </a:lnRef>
+          <a:fillRef idx="1">
+            <a:schemeClr val="accent1"/>
+          </a:fillRef>
+          <a:effectRef idx="0">
+            <a:schemeClr val="accent1"/>
+          </a:effectRef>
+          <a:fontRef idx="minor">
+            <a:schemeClr val="lt1"/>
+          </a:fontRef>
+        </p:style>
+        <p:txBody>
+          <a:bodyPr rtlCol="0" anchor="ctr"/>
+          <a:lstStyle/>
+          <a:p>
+            <a:pPr algn="ctr"/>
+            <a:endParaRPr lang="fr-FR"/>
+          </a:p>
+        </p:txBody>
+      </p:sp>
+      <p:sp>
+        <p:nvSpPr>
+          <p:cNvPr id="35" name="Triangle isocèle 34">
+            <a:extLst>
+              <a:ext uri="{FF2B5EF4-FFF2-40B4-BE49-F238E27FC236}">
+                <a16:creationId xmlns:a16="http://schemas.microsoft.com/office/drawing/2014/main" id="{78E59CBA-180A-4232-BD77-65B7BA21AAE0}"/>
+              </a:ext>
+            </a:extLst>
+          </p:cNvPr>
+          <p:cNvSpPr/>
+          <p:nvPr/>
+        </p:nvSpPr>
+        <p:spPr>
+          <a:xfrm>
+            <a:off x="4633594" y="3518701"/>
+            <a:ext cx="146100" cy="125949"/>
+          </a:xfrm>
+          <a:prstGeom prst="triangle">
+            <a:avLst/>
+          </a:prstGeom>
+          <a:solidFill>
+            <a:schemeClr val="accent2"/>
+          </a:solidFill>
+          <a:ln>
+            <a:solidFill>
+              <a:schemeClr val="accent2"/>
+            </a:solidFill>
+          </a:ln>
+        </p:spPr>
+        <p:style>
+          <a:lnRef idx="2">
+            <a:schemeClr val="accent1">
+              <a:shade val="50000"/>
+            </a:schemeClr>
+          </a:lnRef>
+          <a:fillRef idx="1">
+            <a:schemeClr val="accent1"/>
+          </a:fillRef>
+          <a:effectRef idx="0">
+            <a:schemeClr val="accent1"/>
+          </a:effectRef>
+          <a:fontRef idx="minor">
+            <a:schemeClr val="lt1"/>
+          </a:fontRef>
+        </p:style>
+        <p:txBody>
+          <a:bodyPr rtlCol="0" anchor="ctr"/>
+          <a:lstStyle/>
+          <a:p>
+            <a:pPr algn="ctr"/>
+            <a:endParaRPr lang="fr-FR"/>
+          </a:p>
+        </p:txBody>
+      </p:sp>
+      <p:sp>
+        <p:nvSpPr>
+          <p:cNvPr id="36" name="Rectangle 35">
+            <a:extLst>
+              <a:ext uri="{FF2B5EF4-FFF2-40B4-BE49-F238E27FC236}">
+                <a16:creationId xmlns:a16="http://schemas.microsoft.com/office/drawing/2014/main" id="{12C34C07-96D9-420D-ACC7-698D8B35CEB6}"/>
+              </a:ext>
+            </a:extLst>
+          </p:cNvPr>
+          <p:cNvSpPr/>
+          <p:nvPr/>
+        </p:nvSpPr>
+        <p:spPr>
+          <a:xfrm flipH="1">
+            <a:off x="2890766" y="1508484"/>
+            <a:ext cx="124614" cy="124614"/>
+          </a:xfrm>
+          <a:prstGeom prst="rect">
+            <a:avLst/>
+          </a:prstGeom>
+          <a:solidFill>
+            <a:schemeClr val="accent1"/>
+          </a:solidFill>
+          <a:ln>
+            <a:solidFill>
+              <a:schemeClr val="accent1"/>
+            </a:solidFill>
+          </a:ln>
+        </p:spPr>
+        <p:style>
+          <a:lnRef idx="2">
+            <a:schemeClr val="accent1">
+              <a:shade val="50000"/>
+            </a:schemeClr>
+          </a:lnRef>
+          <a:fillRef idx="1">
+            <a:schemeClr val="accent1"/>
+          </a:fillRef>
+          <a:effectRef idx="0">
+            <a:schemeClr val="accent1"/>
+          </a:effectRef>
+          <a:fontRef idx="minor">
+            <a:schemeClr val="lt1"/>
+          </a:fontRef>
+        </p:style>
+        <p:txBody>
+          <a:bodyPr rtlCol="0" anchor="ctr"/>
+          <a:lstStyle/>
+          <a:p>
+            <a:pPr algn="ctr"/>
+            <a:endParaRPr lang="fr-FR"/>
+          </a:p>
+        </p:txBody>
+      </p:sp>
     </p:spTree>
     <p:extLst>
       <p:ext uri="{BB962C8B-B14F-4D97-AF65-F5344CB8AC3E}">
@@ -6638,7 +6702,7 @@
 <file path=ppt/theme/theme1.xml><?xml version="1.0" encoding="utf-8"?>
 <a:theme xmlns:a="http://schemas.openxmlformats.org/drawingml/2006/main" name="Office Theme">
   <a:themeElements>
-    <a:clrScheme name="Thème Office">
+    <a:clrScheme name="Matplotlib">
       <a:dk1>
         <a:sysClr val="windowText" lastClr="000000"/>
       </a:dk1>
@@ -6652,13 +6716,13 @@
         <a:srgbClr val="E7E6E6"/>
       </a:lt2>
       <a:accent1>
-        <a:srgbClr val="1D9A78"/>
+        <a:srgbClr val="FF7F0E"/>
       </a:accent1>
       <a:accent2>
-        <a:srgbClr val="8BC145"/>
+        <a:srgbClr val="1F77B4"/>
       </a:accent2>
       <a:accent3>
-        <a:srgbClr val="36AFCE"/>
+        <a:srgbClr val="2CA02C"/>
       </a:accent3>
       <a:accent4>
         <a:srgbClr val="1D6FA9"/>

</xml_diff>

<commit_message>
Integrate reviewers comments for final version
</commit_message>
<xml_diff>
--- a/img/graphs.pptx
+++ b/img/graphs.pptx
@@ -198,7 +198,7 @@
           <a:p>
             <a:fld id="{7032D634-87B9-4515-9E90-7412EACBC911}" type="datetimeFigureOut">
               <a:rPr lang="fr-FR" smtClean="0"/>
-              <a:t>02/04/2020</a:t>
+              <a:t>31/08/2020</a:t>
             </a:fld>
             <a:endParaRPr lang="fr-FR"/>
           </a:p>
@@ -596,7 +596,7 @@
           <a:p>
             <a:fld id="{CC506755-3F84-4679-BA59-3527CD676A9A}" type="datetimeFigureOut">
               <a:rPr lang="fr-FR" smtClean="0"/>
-              <a:t>02/04/2020</a:t>
+              <a:t>31/08/2020</a:t>
             </a:fld>
             <a:endParaRPr lang="fr-FR"/>
           </a:p>
@@ -766,7 +766,7 @@
           <a:p>
             <a:fld id="{CC506755-3F84-4679-BA59-3527CD676A9A}" type="datetimeFigureOut">
               <a:rPr lang="fr-FR" smtClean="0"/>
-              <a:t>02/04/2020</a:t>
+              <a:t>31/08/2020</a:t>
             </a:fld>
             <a:endParaRPr lang="fr-FR"/>
           </a:p>
@@ -946,7 +946,7 @@
           <a:p>
             <a:fld id="{CC506755-3F84-4679-BA59-3527CD676A9A}" type="datetimeFigureOut">
               <a:rPr lang="fr-FR" smtClean="0"/>
-              <a:t>02/04/2020</a:t>
+              <a:t>31/08/2020</a:t>
             </a:fld>
             <a:endParaRPr lang="fr-FR"/>
           </a:p>
@@ -1116,7 +1116,7 @@
           <a:p>
             <a:fld id="{CC506755-3F84-4679-BA59-3527CD676A9A}" type="datetimeFigureOut">
               <a:rPr lang="fr-FR" smtClean="0"/>
-              <a:t>02/04/2020</a:t>
+              <a:t>31/08/2020</a:t>
             </a:fld>
             <a:endParaRPr lang="fr-FR"/>
           </a:p>
@@ -1360,7 +1360,7 @@
           <a:p>
             <a:fld id="{CC506755-3F84-4679-BA59-3527CD676A9A}" type="datetimeFigureOut">
               <a:rPr lang="fr-FR" smtClean="0"/>
-              <a:t>02/04/2020</a:t>
+              <a:t>31/08/2020</a:t>
             </a:fld>
             <a:endParaRPr lang="fr-FR"/>
           </a:p>
@@ -1592,7 +1592,7 @@
           <a:p>
             <a:fld id="{CC506755-3F84-4679-BA59-3527CD676A9A}" type="datetimeFigureOut">
               <a:rPr lang="fr-FR" smtClean="0"/>
-              <a:t>02/04/2020</a:t>
+              <a:t>31/08/2020</a:t>
             </a:fld>
             <a:endParaRPr lang="fr-FR"/>
           </a:p>
@@ -1959,7 +1959,7 @@
           <a:p>
             <a:fld id="{CC506755-3F84-4679-BA59-3527CD676A9A}" type="datetimeFigureOut">
               <a:rPr lang="fr-FR" smtClean="0"/>
-              <a:t>02/04/2020</a:t>
+              <a:t>31/08/2020</a:t>
             </a:fld>
             <a:endParaRPr lang="fr-FR"/>
           </a:p>
@@ -2077,7 +2077,7 @@
           <a:p>
             <a:fld id="{CC506755-3F84-4679-BA59-3527CD676A9A}" type="datetimeFigureOut">
               <a:rPr lang="fr-FR" smtClean="0"/>
-              <a:t>02/04/2020</a:t>
+              <a:t>31/08/2020</a:t>
             </a:fld>
             <a:endParaRPr lang="fr-FR"/>
           </a:p>
@@ -2172,7 +2172,7 @@
           <a:p>
             <a:fld id="{CC506755-3F84-4679-BA59-3527CD676A9A}" type="datetimeFigureOut">
               <a:rPr lang="fr-FR" smtClean="0"/>
-              <a:t>02/04/2020</a:t>
+              <a:t>31/08/2020</a:t>
             </a:fld>
             <a:endParaRPr lang="fr-FR"/>
           </a:p>
@@ -2449,7 +2449,7 @@
           <a:p>
             <a:fld id="{CC506755-3F84-4679-BA59-3527CD676A9A}" type="datetimeFigureOut">
               <a:rPr lang="fr-FR" smtClean="0"/>
-              <a:t>02/04/2020</a:t>
+              <a:t>31/08/2020</a:t>
             </a:fld>
             <a:endParaRPr lang="fr-FR"/>
           </a:p>
@@ -2706,7 +2706,7 @@
           <a:p>
             <a:fld id="{CC506755-3F84-4679-BA59-3527CD676A9A}" type="datetimeFigureOut">
               <a:rPr lang="fr-FR" smtClean="0"/>
-              <a:t>02/04/2020</a:t>
+              <a:t>31/08/2020</a:t>
             </a:fld>
             <a:endParaRPr lang="fr-FR"/>
           </a:p>
@@ -2919,7 +2919,7 @@
           <a:p>
             <a:fld id="{CC506755-3F84-4679-BA59-3527CD676A9A}" type="datetimeFigureOut">
               <a:rPr lang="fr-FR" smtClean="0"/>
-              <a:t>02/04/2020</a:t>
+              <a:t>31/08/2020</a:t>
             </a:fld>
             <a:endParaRPr lang="fr-FR"/>
           </a:p>
@@ -4670,8 +4670,8 @@
           </a:fontRef>
         </p:style>
       </p:cxnSp>
-      <mc:AlternateContent xmlns:mc="http://schemas.openxmlformats.org/markup-compatibility/2006" xmlns:a14="http://schemas.microsoft.com/office/drawing/2010/main">
-        <mc:Choice Requires="a14">
+      <mc:AlternateContent xmlns:mc="http://schemas.openxmlformats.org/markup-compatibility/2006">
+        <mc:Choice xmlns:a14="http://schemas.microsoft.com/office/drawing/2010/main" Requires="a14">
           <p:sp>
             <p:nvSpPr>
               <p:cNvPr id="41" name="ZoneTexte 40">
@@ -4687,7 +4687,7 @@
             <p:spPr>
               <a:xfrm>
                 <a:off x="3190093" y="2115381"/>
-                <a:ext cx="470834" cy="447238"/>
+                <a:ext cx="461537" cy="430887"/>
               </a:xfrm>
               <a:prstGeom prst="rect">
                 <a:avLst/>
@@ -4713,37 +4713,28 @@
                       <m:sSub>
                         <m:sSubPr>
                           <m:ctrlPr>
-                            <a:rPr lang="fr-FR" sz="2800" b="0" i="1" smtClean="0">
+                            <a:rPr lang="fr-FR" sz="2800" b="0" i="0" smtClean="0">
                               <a:latin typeface="Cambria Math" panose="02040503050406030204" pitchFamily="18" charset="0"/>
                             </a:rPr>
                           </m:ctrlPr>
                         </m:sSubPr>
                         <m:e>
-                          <m:acc>
-                            <m:accPr>
-                              <m:chr m:val="̇"/>
-                              <m:ctrlPr>
-                                <a:rPr lang="fr-FR" sz="2800" b="0" i="1" smtClean="0">
-                                  <a:latin typeface="Cambria Math" panose="02040503050406030204" pitchFamily="18" charset="0"/>
-                                </a:rPr>
-                              </m:ctrlPr>
-                            </m:accPr>
-                            <m:e>
-                              <m:r>
-                                <a:rPr lang="fr-FR" sz="2800" i="1">
-                                  <a:latin typeface="Cambria Math" panose="02040503050406030204" pitchFamily="18" charset="0"/>
-                                </a:rPr>
-                                <m:t>𝒢</m:t>
-                              </m:r>
-                            </m:e>
-                          </m:acc>
+                          <m:r>
+                            <a:rPr lang="fr-FR" sz="2800" i="1" smtClean="0">
+                              <a:latin typeface="Cambria Math" panose="02040503050406030204" pitchFamily="18" charset="0"/>
+                            </a:rPr>
+                            <m:t>𝒢</m:t>
+                          </m:r>
                         </m:e>
                         <m:sub>
                           <m:r>
-                            <a:rPr lang="fr-FR" sz="2800" b="0" i="1" smtClean="0">
+                            <m:rPr>
+                              <m:sty m:val="p"/>
+                            </m:rPr>
+                            <a:rPr lang="fr-FR" sz="2800" b="0" i="0" smtClean="0">
                               <a:latin typeface="Cambria Math" panose="02040503050406030204" pitchFamily="18" charset="0"/>
                             </a:rPr>
-                            <m:t>𝑛</m:t>
+                            <m:t>n</m:t>
                           </m:r>
                         </m:sub>
                       </m:sSub>
@@ -4755,7 +4746,7 @@
             </p:txBody>
           </p:sp>
         </mc:Choice>
-        <mc:Fallback xmlns="">
+        <mc:Fallback>
           <p:sp>
             <p:nvSpPr>
               <p:cNvPr id="41" name="ZoneTexte 40">
@@ -4773,7 +4764,7 @@
             <p:spPr>
               <a:xfrm>
                 <a:off x="3190093" y="2115381"/>
-                <a:ext cx="470834" cy="447238"/>
+                <a:ext cx="461537" cy="430887"/>
               </a:xfrm>
               <a:prstGeom prst="rect">
                 <a:avLst/>
@@ -5468,6 +5459,108 @@
           </a:p>
         </p:txBody>
       </p:sp>
+      <mc:AlternateContent xmlns:mc="http://schemas.openxmlformats.org/markup-compatibility/2006">
+        <mc:Choice xmlns:a14="http://schemas.microsoft.com/office/drawing/2010/main" Requires="a14">
+          <p:sp>
+            <p:nvSpPr>
+              <p:cNvPr id="2" name="ZoneTexte 1">
+                <a:extLst>
+                  <a:ext uri="{FF2B5EF4-FFF2-40B4-BE49-F238E27FC236}">
+                    <a16:creationId xmlns:a16="http://schemas.microsoft.com/office/drawing/2014/main" id="{4DE3BE4A-1B33-4A17-B2F7-0DC3E00F2154}"/>
+                  </a:ext>
+                </a:extLst>
+              </p:cNvPr>
+              <p:cNvSpPr txBox="1"/>
+              <p:nvPr/>
+            </p:nvSpPr>
+            <p:spPr>
+              <a:xfrm>
+                <a:off x="3297907" y="2006299"/>
+                <a:ext cx="155492" cy="276999"/>
+              </a:xfrm>
+              <a:prstGeom prst="rect">
+                <a:avLst/>
+              </a:prstGeom>
+              <a:noFill/>
+              <a:ln>
+                <a:noFill/>
+              </a:ln>
+            </p:spPr>
+            <p:txBody>
+              <a:bodyPr wrap="none" lIns="0" tIns="0" rIns="0" bIns="0" rtlCol="0">
+                <a:spAutoFit/>
+              </a:bodyPr>
+              <a:lstStyle/>
+              <a:p>
+                <a:pPr/>
+                <a14:m>
+                  <m:oMathPara xmlns:m="http://schemas.openxmlformats.org/officeDocument/2006/math">
+                    <m:oMathParaPr>
+                      <m:jc m:val="centerGroup"/>
+                    </m:oMathParaPr>
+                    <m:oMath xmlns:m="http://schemas.openxmlformats.org/officeDocument/2006/math">
+                      <m:r>
+                        <a:rPr lang="fr-FR" b="0" i="1" smtClean="0">
+                          <a:latin typeface="Cambria Math" panose="02040503050406030204" pitchFamily="18" charset="0"/>
+                        </a:rPr>
+                        <m:t>∘</m:t>
+                      </m:r>
+                    </m:oMath>
+                  </m:oMathPara>
+                </a14:m>
+                <a:endParaRPr lang="fr-FR" sz="2800" dirty="0"/>
+              </a:p>
+            </p:txBody>
+          </p:sp>
+        </mc:Choice>
+        <mc:Fallback>
+          <p:sp>
+            <p:nvSpPr>
+              <p:cNvPr id="2" name="ZoneTexte 1">
+                <a:extLst>
+                  <a:ext uri="{FF2B5EF4-FFF2-40B4-BE49-F238E27FC236}">
+                    <a16:creationId xmlns:a16="http://schemas.microsoft.com/office/drawing/2014/main" id="{4DE3BE4A-1B33-4A17-B2F7-0DC3E00F2154}"/>
+                  </a:ext>
+                </a:extLst>
+              </p:cNvPr>
+              <p:cNvSpPr txBox="1">
+                <a:spLocks noRot="1" noChangeAspect="1" noMove="1" noResize="1" noEditPoints="1" noAdjustHandles="1" noChangeArrowheads="1" noChangeShapeType="1" noTextEdit="1"/>
+              </p:cNvSpPr>
+              <p:nvPr/>
+            </p:nvSpPr>
+            <p:spPr>
+              <a:xfrm>
+                <a:off x="3297907" y="2006299"/>
+                <a:ext cx="155492" cy="276999"/>
+              </a:xfrm>
+              <a:prstGeom prst="rect">
+                <a:avLst/>
+              </a:prstGeom>
+              <a:blipFill>
+                <a:blip r:embed="rId4"/>
+                <a:stretch>
+                  <a:fillRect l="-19231" r="-15385"/>
+                </a:stretch>
+              </a:blipFill>
+              <a:ln>
+                <a:noFill/>
+              </a:ln>
+            </p:spPr>
+            <p:txBody>
+              <a:bodyPr/>
+              <a:lstStyle/>
+              <a:p>
+                <a:r>
+                  <a:rPr lang="fr-FR">
+                    <a:noFill/>
+                  </a:rPr>
+                  <a:t> </a:t>
+                </a:r>
+              </a:p>
+            </p:txBody>
+          </p:sp>
+        </mc:Fallback>
+      </mc:AlternateContent>
     </p:spTree>
     <p:extLst>
       <p:ext uri="{BB962C8B-B14F-4D97-AF65-F5344CB8AC3E}">

</xml_diff>